<commit_message>
Scripts Dia 8 - Windows Function
</commit_message>
<xml_diff>
--- a/Presentaciones/Semana 8 - Windows Function.pptx
+++ b/Presentaciones/Semana 8 - Windows Function.pptx
@@ -3474,7 +3474,7 @@
           <a:p>
             <a:fld id="{1E61A9BF-0BFA-43BA-9075-7BAB5702E502}" type="datetimeFigureOut">
               <a:rPr lang="es-ES" smtClean="0"/>
-              <a:t>17/07/2021</a:t>
+              <a:t>18/07/2021</a:t>
             </a:fld>
             <a:endParaRPr lang="es-ES"/>
           </a:p>
@@ -3872,7 +3872,7 @@
           <a:p>
             <a:fld id="{D773F917-CF9F-4E5E-A9C0-25A32D536801}" type="datetimeFigureOut">
               <a:rPr lang="es-NI" smtClean="0"/>
-              <a:t>17/7/2021</a:t>
+              <a:t>18/7/2021</a:t>
             </a:fld>
             <a:endParaRPr lang="es-NI"/>
           </a:p>
@@ -4042,7 +4042,7 @@
           <a:p>
             <a:fld id="{D773F917-CF9F-4E5E-A9C0-25A32D536801}" type="datetimeFigureOut">
               <a:rPr lang="es-NI" smtClean="0"/>
-              <a:t>17/7/2021</a:t>
+              <a:t>18/7/2021</a:t>
             </a:fld>
             <a:endParaRPr lang="es-NI"/>
           </a:p>
@@ -4222,7 +4222,7 @@
           <a:p>
             <a:fld id="{D773F917-CF9F-4E5E-A9C0-25A32D536801}" type="datetimeFigureOut">
               <a:rPr lang="es-NI" smtClean="0"/>
-              <a:t>17/7/2021</a:t>
+              <a:t>18/7/2021</a:t>
             </a:fld>
             <a:endParaRPr lang="es-NI"/>
           </a:p>
@@ -4416,7 +4416,7 @@
           <a:p>
             <a:fld id="{D773F917-CF9F-4E5E-A9C0-25A32D536801}" type="datetimeFigureOut">
               <a:rPr lang="es-NI" smtClean="0"/>
-              <a:t>17/7/2021</a:t>
+              <a:t>18/7/2021</a:t>
             </a:fld>
             <a:endParaRPr lang="es-NI"/>
           </a:p>
@@ -5199,7 +5199,7 @@
           <a:p>
             <a:fld id="{D773F917-CF9F-4E5E-A9C0-25A32D536801}" type="datetimeFigureOut">
               <a:rPr lang="es-NI" smtClean="0"/>
-              <a:t>17/7/2021</a:t>
+              <a:t>18/7/2021</a:t>
             </a:fld>
             <a:endParaRPr lang="es-NI"/>
           </a:p>
@@ -5431,7 +5431,7 @@
           <a:p>
             <a:fld id="{D773F917-CF9F-4E5E-A9C0-25A32D536801}" type="datetimeFigureOut">
               <a:rPr lang="es-NI" smtClean="0"/>
-              <a:t>17/7/2021</a:t>
+              <a:t>18/7/2021</a:t>
             </a:fld>
             <a:endParaRPr lang="es-NI"/>
           </a:p>
@@ -5798,7 +5798,7 @@
           <a:p>
             <a:fld id="{D773F917-CF9F-4E5E-A9C0-25A32D536801}" type="datetimeFigureOut">
               <a:rPr lang="es-NI" smtClean="0"/>
-              <a:t>17/7/2021</a:t>
+              <a:t>18/7/2021</a:t>
             </a:fld>
             <a:endParaRPr lang="es-NI"/>
           </a:p>
@@ -6487,7 +6487,7 @@
           <a:p>
             <a:fld id="{D773F917-CF9F-4E5E-A9C0-25A32D536801}" type="datetimeFigureOut">
               <a:rPr lang="es-NI" smtClean="0"/>
-              <a:t>17/7/2021</a:t>
+              <a:t>18/7/2021</a:t>
             </a:fld>
             <a:endParaRPr lang="es-NI"/>
           </a:p>
@@ -6582,7 +6582,7 @@
           <a:p>
             <a:fld id="{D773F917-CF9F-4E5E-A9C0-25A32D536801}" type="datetimeFigureOut">
               <a:rPr lang="es-NI" smtClean="0"/>
-              <a:t>17/7/2021</a:t>
+              <a:t>18/7/2021</a:t>
             </a:fld>
             <a:endParaRPr lang="es-NI"/>
           </a:p>
@@ -6859,7 +6859,7 @@
           <a:p>
             <a:fld id="{D773F917-CF9F-4E5E-A9C0-25A32D536801}" type="datetimeFigureOut">
               <a:rPr lang="es-NI" smtClean="0"/>
-              <a:t>17/7/2021</a:t>
+              <a:t>18/7/2021</a:t>
             </a:fld>
             <a:endParaRPr lang="es-NI"/>
           </a:p>
@@ -7116,7 +7116,7 @@
           <a:p>
             <a:fld id="{D773F917-CF9F-4E5E-A9C0-25A32D536801}" type="datetimeFigureOut">
               <a:rPr lang="es-NI" smtClean="0"/>
-              <a:t>17/7/2021</a:t>
+              <a:t>18/7/2021</a:t>
             </a:fld>
             <a:endParaRPr lang="es-NI"/>
           </a:p>
@@ -7338,7 +7338,7 @@
           <a:p>
             <a:fld id="{D773F917-CF9F-4E5E-A9C0-25A32D536801}" type="datetimeFigureOut">
               <a:rPr lang="es-NI" smtClean="0"/>
-              <a:t>17/7/2021</a:t>
+              <a:t>18/7/2021</a:t>
             </a:fld>
             <a:endParaRPr lang="es-NI"/>
           </a:p>
@@ -15438,7 +15438,7 @@
         </p:blipFill>
         <p:spPr>
           <a:xfrm>
-            <a:off x="715438" y="2753156"/>
+            <a:off x="821915" y="142687"/>
             <a:ext cx="7391060" cy="1560051"/>
           </a:xfrm>
           <a:prstGeom prst="rect">
@@ -16341,7 +16341,7 @@
           <a:p>
             <a:r>
               <a:rPr lang="es-NI" dirty="0"/>
-              <a:t>PARTIION BY </a:t>
+              <a:t>PARTITION BY </a:t>
             </a:r>
             <a:r>
               <a:rPr lang="es-NI" dirty="0" err="1"/>

</xml_diff>